<commit_message>
Updated OF, Pre-processing, Figures
</commit_message>
<xml_diff>
--- a/Figures/figures.pptx
+++ b/Figures/figures.pptx
@@ -5,10 +5,12 @@
     <p:sldMasterId id="2147483648" r:id="rId1"/>
   </p:sldMasterIdLst>
   <p:notesMasterIdLst>
-    <p:notesMasterId r:id="rId3"/>
+    <p:notesMasterId r:id="rId5"/>
   </p:notesMasterIdLst>
   <p:sldIdLst>
     <p:sldId id="256" r:id="rId2"/>
+    <p:sldId id="257" r:id="rId3"/>
+    <p:sldId id="259" r:id="rId4"/>
   </p:sldIdLst>
   <p:sldSz cx="9144000" cy="6858000" type="screen4x3"/>
   <p:notesSz cx="6858000" cy="9144000"/>
@@ -192,7 +194,7 @@
           <a:p>
             <a:fld id="{213623D3-1946-46B8-AA11-4C2F126ABD86}" type="datetimeFigureOut">
               <a:rPr lang="en-US" smtClean="0"/>
-              <a:t>12/16/2014</a:t>
+              <a:t>12/17/2014</a:t>
             </a:fld>
             <a:endParaRPr lang="en-US"/>
           </a:p>
@@ -544,6 +546,90 @@
 </p:notes>
 </file>
 
+<file path=ppt/notesSlides/notesSlide2.xml><?xml version="1.0" encoding="utf-8"?>
+<p:notes xmlns:a="http://schemas.openxmlformats.org/drawingml/2006/main" xmlns:r="http://schemas.openxmlformats.org/officeDocument/2006/relationships" xmlns:p="http://schemas.openxmlformats.org/presentationml/2006/main">
+  <p:cSld>
+    <p:spTree>
+      <p:nvGrpSpPr>
+        <p:cNvPr id="1" name=""/>
+        <p:cNvGrpSpPr/>
+        <p:nvPr/>
+      </p:nvGrpSpPr>
+      <p:grpSpPr>
+        <a:xfrm>
+          <a:off x="0" y="0"/>
+          <a:ext cx="0" cy="0"/>
+          <a:chOff x="0" y="0"/>
+          <a:chExt cx="0" cy="0"/>
+        </a:xfrm>
+      </p:grpSpPr>
+      <p:sp>
+        <p:nvSpPr>
+          <p:cNvPr id="2" name="Slide Image Placeholder 1"/>
+          <p:cNvSpPr>
+            <a:spLocks noGrp="1" noRot="1" noChangeAspect="1"/>
+          </p:cNvSpPr>
+          <p:nvPr>
+            <p:ph type="sldImg"/>
+          </p:nvPr>
+        </p:nvSpPr>
+        <p:spPr/>
+      </p:sp>
+      <p:sp>
+        <p:nvSpPr>
+          <p:cNvPr id="3" name="Notes Placeholder 2"/>
+          <p:cNvSpPr>
+            <a:spLocks noGrp="1"/>
+          </p:cNvSpPr>
+          <p:nvPr>
+            <p:ph type="body" idx="1"/>
+          </p:nvPr>
+        </p:nvSpPr>
+        <p:spPr/>
+        <p:txBody>
+          <a:bodyPr/>
+          <a:lstStyle/>
+          <a:p>
+            <a:endParaRPr lang="en-US" dirty="0"/>
+          </a:p>
+        </p:txBody>
+      </p:sp>
+      <p:sp>
+        <p:nvSpPr>
+          <p:cNvPr id="4" name="Slide Number Placeholder 3"/>
+          <p:cNvSpPr>
+            <a:spLocks noGrp="1"/>
+          </p:cNvSpPr>
+          <p:nvPr>
+            <p:ph type="sldNum" sz="quarter" idx="10"/>
+          </p:nvPr>
+        </p:nvSpPr>
+        <p:spPr/>
+        <p:txBody>
+          <a:bodyPr/>
+          <a:lstStyle/>
+          <a:p>
+            <a:fld id="{C7E30BE1-F825-48FC-A73E-F32CF308D949}" type="slidenum">
+              <a:rPr lang="en-US" smtClean="0"/>
+              <a:t>3</a:t>
+            </a:fld>
+            <a:endParaRPr lang="en-US"/>
+          </a:p>
+        </p:txBody>
+      </p:sp>
+    </p:spTree>
+    <p:extLst>
+      <p:ext uri="{BB962C8B-B14F-4D97-AF65-F5344CB8AC3E}">
+        <p14:creationId xmlns:p14="http://schemas.microsoft.com/office/powerpoint/2010/main" val="4248475680"/>
+      </p:ext>
+    </p:extLst>
+  </p:cSld>
+  <p:clrMapOvr>
+    <a:masterClrMapping/>
+  </p:clrMapOvr>
+</p:notes>
+</file>
+
 <file path=ppt/slideLayouts/slideLayout1.xml><?xml version="1.0" encoding="utf-8"?>
 <p:sldLayout xmlns:a="http://schemas.openxmlformats.org/drawingml/2006/main" xmlns:r="http://schemas.openxmlformats.org/officeDocument/2006/relationships" xmlns:p="http://schemas.openxmlformats.org/presentationml/2006/main" type="title" preserve="1">
   <p:cSld name="Title Slide">
@@ -726,7 +812,7 @@
             <a:fld id="{1D8BD707-D9CF-40AE-B4C6-C98DA3205C09}" type="datetimeFigureOut">
               <a:rPr lang="en-US" smtClean="0"/>
               <a:pPr/>
-              <a:t>12/16/2014</a:t>
+              <a:t>12/17/2014</a:t>
             </a:fld>
             <a:endParaRPr lang="en-US"/>
           </a:p>
@@ -893,7 +979,7 @@
             <a:fld id="{1D8BD707-D9CF-40AE-B4C6-C98DA3205C09}" type="datetimeFigureOut">
               <a:rPr lang="en-US" smtClean="0"/>
               <a:pPr/>
-              <a:t>12/16/2014</a:t>
+              <a:t>12/17/2014</a:t>
             </a:fld>
             <a:endParaRPr lang="en-US"/>
           </a:p>
@@ -1070,7 +1156,7 @@
             <a:fld id="{1D8BD707-D9CF-40AE-B4C6-C98DA3205C09}" type="datetimeFigureOut">
               <a:rPr lang="en-US" smtClean="0"/>
               <a:pPr/>
-              <a:t>12/16/2014</a:t>
+              <a:t>12/17/2014</a:t>
             </a:fld>
             <a:endParaRPr lang="en-US"/>
           </a:p>
@@ -1237,7 +1323,7 @@
             <a:fld id="{1D8BD707-D9CF-40AE-B4C6-C98DA3205C09}" type="datetimeFigureOut">
               <a:rPr lang="en-US" smtClean="0"/>
               <a:pPr/>
-              <a:t>12/16/2014</a:t>
+              <a:t>12/17/2014</a:t>
             </a:fld>
             <a:endParaRPr lang="en-US"/>
           </a:p>
@@ -1480,7 +1566,7 @@
             <a:fld id="{1D8BD707-D9CF-40AE-B4C6-C98DA3205C09}" type="datetimeFigureOut">
               <a:rPr lang="en-US" smtClean="0"/>
               <a:pPr/>
-              <a:t>12/16/2014</a:t>
+              <a:t>12/17/2014</a:t>
             </a:fld>
             <a:endParaRPr lang="en-US"/>
           </a:p>
@@ -1765,7 +1851,7 @@
             <a:fld id="{1D8BD707-D9CF-40AE-B4C6-C98DA3205C09}" type="datetimeFigureOut">
               <a:rPr lang="en-US" smtClean="0"/>
               <a:pPr/>
-              <a:t>12/16/2014</a:t>
+              <a:t>12/17/2014</a:t>
             </a:fld>
             <a:endParaRPr lang="en-US"/>
           </a:p>
@@ -2184,7 +2270,7 @@
             <a:fld id="{1D8BD707-D9CF-40AE-B4C6-C98DA3205C09}" type="datetimeFigureOut">
               <a:rPr lang="en-US" smtClean="0"/>
               <a:pPr/>
-              <a:t>12/16/2014</a:t>
+              <a:t>12/17/2014</a:t>
             </a:fld>
             <a:endParaRPr lang="en-US"/>
           </a:p>
@@ -2299,7 +2385,7 @@
             <a:fld id="{1D8BD707-D9CF-40AE-B4C6-C98DA3205C09}" type="datetimeFigureOut">
               <a:rPr lang="en-US" smtClean="0"/>
               <a:pPr/>
-              <a:t>12/16/2014</a:t>
+              <a:t>12/17/2014</a:t>
             </a:fld>
             <a:endParaRPr lang="en-US"/>
           </a:p>
@@ -2391,7 +2477,7 @@
             <a:fld id="{1D8BD707-D9CF-40AE-B4C6-C98DA3205C09}" type="datetimeFigureOut">
               <a:rPr lang="en-US" smtClean="0"/>
               <a:pPr/>
-              <a:t>12/16/2014</a:t>
+              <a:t>12/17/2014</a:t>
             </a:fld>
             <a:endParaRPr lang="en-US"/>
           </a:p>
@@ -2665,7 +2751,7 @@
             <a:fld id="{1D8BD707-D9CF-40AE-B4C6-C98DA3205C09}" type="datetimeFigureOut">
               <a:rPr lang="en-US" smtClean="0"/>
               <a:pPr/>
-              <a:t>12/16/2014</a:t>
+              <a:t>12/17/2014</a:t>
             </a:fld>
             <a:endParaRPr lang="en-US"/>
           </a:p>
@@ -2915,7 +3001,7 @@
             <a:fld id="{1D8BD707-D9CF-40AE-B4C6-C98DA3205C09}" type="datetimeFigureOut">
               <a:rPr lang="en-US" smtClean="0"/>
               <a:pPr/>
-              <a:t>12/16/2014</a:t>
+              <a:t>12/17/2014</a:t>
             </a:fld>
             <a:endParaRPr lang="en-US"/>
           </a:p>
@@ -3125,7 +3211,7 @@
             <a:fld id="{1D8BD707-D9CF-40AE-B4C6-C98DA3205C09}" type="datetimeFigureOut">
               <a:rPr lang="en-US" smtClean="0"/>
               <a:pPr/>
-              <a:t>12/16/2014</a:t>
+              <a:t>12/17/2014</a:t>
             </a:fld>
             <a:endParaRPr lang="en-US"/>
           </a:p>
@@ -3612,6 +3698,393 @@
   <p:clrMapOvr>
     <a:masterClrMapping/>
   </p:clrMapOvr>
+  <p:timing>
+    <p:tnLst>
+      <p:par>
+        <p:cTn id="1" dur="indefinite" restart="never" nodeType="tmRoot"/>
+      </p:par>
+    </p:tnLst>
+  </p:timing>
+</p:sld>
+</file>
+
+<file path=ppt/slides/slide2.xml><?xml version="1.0" encoding="utf-8"?>
+<p:sld xmlns:a="http://schemas.openxmlformats.org/drawingml/2006/main" xmlns:r="http://schemas.openxmlformats.org/officeDocument/2006/relationships" xmlns:p="http://schemas.openxmlformats.org/presentationml/2006/main">
+  <p:cSld>
+    <p:spTree>
+      <p:nvGrpSpPr>
+        <p:cNvPr id="1" name=""/>
+        <p:cNvGrpSpPr/>
+        <p:nvPr/>
+      </p:nvGrpSpPr>
+      <p:grpSpPr>
+        <a:xfrm>
+          <a:off x="0" y="0"/>
+          <a:ext cx="0" cy="0"/>
+          <a:chOff x="0" y="0"/>
+          <a:chExt cx="0" cy="0"/>
+        </a:xfrm>
+      </p:grpSpPr>
+      <p:sp>
+        <p:nvSpPr>
+          <p:cNvPr id="2" name="Title 1"/>
+          <p:cNvSpPr>
+            <a:spLocks noGrp="1"/>
+          </p:cNvSpPr>
+          <p:nvPr>
+            <p:ph type="title"/>
+          </p:nvPr>
+        </p:nvSpPr>
+        <p:spPr/>
+        <p:txBody>
+          <a:bodyPr/>
+          <a:lstStyle/>
+          <a:p>
+            <a:endParaRPr lang="en-US"/>
+          </a:p>
+        </p:txBody>
+      </p:sp>
+      <p:sp>
+        <p:nvSpPr>
+          <p:cNvPr id="3" name="Content Placeholder 2"/>
+          <p:cNvSpPr>
+            <a:spLocks noGrp="1"/>
+          </p:cNvSpPr>
+          <p:nvPr>
+            <p:ph idx="1"/>
+          </p:nvPr>
+        </p:nvSpPr>
+        <p:spPr/>
+        <p:txBody>
+          <a:bodyPr/>
+          <a:lstStyle/>
+          <a:p>
+            <a:endParaRPr lang="en-US" dirty="0"/>
+          </a:p>
+        </p:txBody>
+      </p:sp>
+      <p:pic>
+        <p:nvPicPr>
+          <p:cNvPr id="1026" name="Picture 2" descr="C:\Users\deepti\Documents\Kishore_UTRC\LIDAR_ICLR\Figures\OpticalFlow_example.png"/>
+          <p:cNvPicPr>
+            <a:picLocks noChangeAspect="1" noChangeArrowheads="1"/>
+          </p:cNvPicPr>
+          <p:nvPr/>
+        </p:nvPicPr>
+        <p:blipFill rotWithShape="1">
+          <a:blip r:embed="rId2">
+            <a:extLst>
+              <a:ext uri="{28A0092B-C50C-407E-A947-70E740481C1C}">
+                <a14:useLocalDpi xmlns:a14="http://schemas.microsoft.com/office/drawing/2010/main" val="0"/>
+              </a:ext>
+            </a:extLst>
+          </a:blip>
+          <a:srcRect l="11547" t="28777" r="8718" b="31576"/>
+          <a:stretch/>
+        </p:blipFill>
+        <p:spPr bwMode="auto">
+          <a:xfrm>
+            <a:off x="457200" y="2743200"/>
+            <a:ext cx="5832763" cy="2175165"/>
+          </a:xfrm>
+          <a:prstGeom prst="rect">
+            <a:avLst/>
+          </a:prstGeom>
+          <a:noFill/>
+          <a:extLst>
+            <a:ext uri="{909E8E84-426E-40DD-AFC4-6F175D3DCCD1}">
+              <a14:hiddenFill xmlns:a14="http://schemas.microsoft.com/office/drawing/2010/main">
+                <a:solidFill>
+                  <a:srgbClr val="FFFFFF"/>
+                </a:solidFill>
+              </a14:hiddenFill>
+            </a:ext>
+          </a:extLst>
+        </p:spPr>
+      </p:pic>
+      <p:pic>
+        <p:nvPicPr>
+          <p:cNvPr id="1027" name="Picture 3" descr="C:\Users\deepti\Documents\Kishore_UTRC\LIDAR_ICLR\Figures\colorwheel.png"/>
+          <p:cNvPicPr>
+            <a:picLocks noChangeAspect="1" noChangeArrowheads="1"/>
+          </p:cNvPicPr>
+          <p:nvPr/>
+        </p:nvPicPr>
+        <p:blipFill rotWithShape="1">
+          <a:blip r:embed="rId3" cstate="print">
+            <a:extLst>
+              <a:ext uri="{28A0092B-C50C-407E-A947-70E740481C1C}">
+                <a14:useLocalDpi xmlns:a14="http://schemas.microsoft.com/office/drawing/2010/main" val="0"/>
+              </a:ext>
+            </a:extLst>
+          </a:blip>
+          <a:srcRect l="20176" t="8124" r="13395" b="10983"/>
+          <a:stretch/>
+        </p:blipFill>
+        <p:spPr bwMode="auto">
+          <a:xfrm>
+            <a:off x="5718463" y="2768673"/>
+            <a:ext cx="571500" cy="522000"/>
+          </a:xfrm>
+          <a:prstGeom prst="rect">
+            <a:avLst/>
+          </a:prstGeom>
+          <a:noFill/>
+          <a:ln>
+            <a:solidFill>
+              <a:schemeClr val="accent1"/>
+            </a:solidFill>
+          </a:ln>
+          <a:extLst>
+            <a:ext uri="{909E8E84-426E-40DD-AFC4-6F175D3DCCD1}">
+              <a14:hiddenFill xmlns:a14="http://schemas.microsoft.com/office/drawing/2010/main">
+                <a:solidFill>
+                  <a:srgbClr val="FFFFFF"/>
+                </a:solidFill>
+              </a14:hiddenFill>
+            </a:ext>
+          </a:extLst>
+        </p:spPr>
+      </p:pic>
+      <p:sp>
+        <p:nvSpPr>
+          <p:cNvPr id="4" name="TextBox 3"/>
+          <p:cNvSpPr txBox="1"/>
+          <p:nvPr/>
+        </p:nvSpPr>
+        <p:spPr>
+          <a:xfrm>
+            <a:off x="762000" y="4736068"/>
+            <a:ext cx="775725" cy="307777"/>
+          </a:xfrm>
+          <a:prstGeom prst="rect">
+            <a:avLst/>
+          </a:prstGeom>
+          <a:noFill/>
+        </p:spPr>
+        <p:txBody>
+          <a:bodyPr wrap="none" rtlCol="0">
+            <a:spAutoFit/>
+          </a:bodyPr>
+          <a:lstStyle/>
+          <a:p>
+            <a:r>
+              <a:rPr lang="en-US" sz="1400" dirty="0" smtClean="0"/>
+              <a:t>Frame 1</a:t>
+            </a:r>
+            <a:endParaRPr lang="en-US" sz="1400" dirty="0"/>
+          </a:p>
+        </p:txBody>
+      </p:sp>
+      <p:sp>
+        <p:nvSpPr>
+          <p:cNvPr id="7" name="TextBox 6"/>
+          <p:cNvSpPr txBox="1"/>
+          <p:nvPr/>
+        </p:nvSpPr>
+        <p:spPr>
+          <a:xfrm>
+            <a:off x="2900503" y="4736068"/>
+            <a:ext cx="775725" cy="307777"/>
+          </a:xfrm>
+          <a:prstGeom prst="rect">
+            <a:avLst/>
+          </a:prstGeom>
+          <a:noFill/>
+        </p:spPr>
+        <p:txBody>
+          <a:bodyPr wrap="none" rtlCol="0">
+            <a:spAutoFit/>
+          </a:bodyPr>
+          <a:lstStyle/>
+          <a:p>
+            <a:r>
+              <a:rPr lang="en-US" sz="1400" dirty="0" smtClean="0"/>
+              <a:t>Frame 2</a:t>
+            </a:r>
+            <a:endParaRPr lang="en-US" sz="1400" dirty="0"/>
+          </a:p>
+        </p:txBody>
+      </p:sp>
+      <p:sp>
+        <p:nvSpPr>
+          <p:cNvPr id="8" name="TextBox 7"/>
+          <p:cNvSpPr txBox="1"/>
+          <p:nvPr/>
+        </p:nvSpPr>
+        <p:spPr>
+          <a:xfrm>
+            <a:off x="5105400" y="4736068"/>
+            <a:ext cx="1087414" cy="307777"/>
+          </a:xfrm>
+          <a:prstGeom prst="rect">
+            <a:avLst/>
+          </a:prstGeom>
+          <a:noFill/>
+        </p:spPr>
+        <p:txBody>
+          <a:bodyPr wrap="none" rtlCol="0">
+            <a:spAutoFit/>
+          </a:bodyPr>
+          <a:lstStyle/>
+          <a:p>
+            <a:r>
+              <a:rPr lang="en-US" sz="1400" dirty="0" smtClean="0"/>
+              <a:t>Optical Flow</a:t>
+            </a:r>
+            <a:endParaRPr lang="en-US" sz="1400" dirty="0"/>
+          </a:p>
+        </p:txBody>
+      </p:sp>
+    </p:spTree>
+    <p:extLst>
+      <p:ext uri="{BB962C8B-B14F-4D97-AF65-F5344CB8AC3E}">
+        <p14:creationId xmlns:p14="http://schemas.microsoft.com/office/powerpoint/2010/main" val="3900031393"/>
+      </p:ext>
+    </p:extLst>
+  </p:cSld>
+  <p:clrMapOvr>
+    <a:masterClrMapping/>
+  </p:clrMapOvr>
+  <p:timing>
+    <p:tnLst>
+      <p:par>
+        <p:cTn id="1" dur="indefinite" restart="never" nodeType="tmRoot"/>
+      </p:par>
+    </p:tnLst>
+  </p:timing>
+</p:sld>
+</file>
+
+<file path=ppt/slides/slide3.xml><?xml version="1.0" encoding="utf-8"?>
+<p:sld xmlns:a="http://schemas.openxmlformats.org/drawingml/2006/main" xmlns:r="http://schemas.openxmlformats.org/officeDocument/2006/relationships" xmlns:p="http://schemas.openxmlformats.org/presentationml/2006/main">
+  <p:cSld>
+    <p:spTree>
+      <p:nvGrpSpPr>
+        <p:cNvPr id="1" name=""/>
+        <p:cNvGrpSpPr/>
+        <p:nvPr/>
+      </p:nvGrpSpPr>
+      <p:grpSpPr>
+        <a:xfrm>
+          <a:off x="0" y="0"/>
+          <a:ext cx="0" cy="0"/>
+          <a:chOff x="0" y="0"/>
+          <a:chExt cx="0" cy="0"/>
+        </a:xfrm>
+      </p:grpSpPr>
+      <p:pic>
+        <p:nvPicPr>
+          <p:cNvPr id="1026" name="Picture 2"/>
+          <p:cNvPicPr>
+            <a:picLocks noChangeAspect="1" noChangeArrowheads="1"/>
+          </p:cNvPicPr>
+          <p:nvPr/>
+        </p:nvPicPr>
+        <p:blipFill>
+          <a:blip r:embed="rId3" cstate="print">
+            <a:extLst>
+              <a:ext uri="{28A0092B-C50C-407E-A947-70E740481C1C}">
+                <a14:useLocalDpi xmlns:a14="http://schemas.microsoft.com/office/drawing/2010/main" val="0"/>
+              </a:ext>
+            </a:extLst>
+          </a:blip>
+          <a:srcRect/>
+          <a:stretch>
+            <a:fillRect/>
+          </a:stretch>
+        </p:blipFill>
+        <p:spPr bwMode="auto">
+          <a:xfrm>
+            <a:off x="304800" y="1828800"/>
+            <a:ext cx="4622358" cy="3094306"/>
+          </a:xfrm>
+          <a:prstGeom prst="rect">
+            <a:avLst/>
+          </a:prstGeom>
+          <a:noFill/>
+          <a:ln>
+            <a:noFill/>
+          </a:ln>
+          <a:extLst>
+            <a:ext uri="{909E8E84-426E-40DD-AFC4-6F175D3DCCD1}">
+              <a14:hiddenFill xmlns:a14="http://schemas.microsoft.com/office/drawing/2010/main">
+                <a:solidFill>
+                  <a:schemeClr val="accent1"/>
+                </a:solidFill>
+              </a14:hiddenFill>
+            </a:ext>
+            <a:ext uri="{91240B29-F687-4F45-9708-019B960494DF}">
+              <a14:hiddenLine xmlns:a14="http://schemas.microsoft.com/office/drawing/2010/main" w="9525">
+                <a:solidFill>
+                  <a:schemeClr val="tx1"/>
+                </a:solidFill>
+                <a:miter lim="800000"/>
+                <a:headEnd/>
+                <a:tailEnd/>
+              </a14:hiddenLine>
+            </a:ext>
+          </a:extLst>
+        </p:spPr>
+      </p:pic>
+      <p:pic>
+        <p:nvPicPr>
+          <p:cNvPr id="2050" name="Picture 2" descr="C:\Users\deepti\Documents\Kishore_UTRC\LIDAR_ICLR\Figures\Ford_sample_image.png"/>
+          <p:cNvPicPr>
+            <a:picLocks noChangeAspect="1" noChangeArrowheads="1"/>
+          </p:cNvPicPr>
+          <p:nvPr/>
+        </p:nvPicPr>
+        <p:blipFill>
+          <a:blip r:embed="rId4">
+            <a:extLst>
+              <a:ext uri="{28A0092B-C50C-407E-A947-70E740481C1C}">
+                <a14:useLocalDpi xmlns:a14="http://schemas.microsoft.com/office/drawing/2010/main" val="0"/>
+              </a:ext>
+            </a:extLst>
+          </a:blip>
+          <a:srcRect/>
+          <a:stretch>
+            <a:fillRect/>
+          </a:stretch>
+        </p:blipFill>
+        <p:spPr bwMode="auto">
+          <a:xfrm>
+            <a:off x="5410200" y="1828800"/>
+            <a:ext cx="2360131" cy="3094306"/>
+          </a:xfrm>
+          <a:prstGeom prst="rect">
+            <a:avLst/>
+          </a:prstGeom>
+          <a:noFill/>
+          <a:extLst>
+            <a:ext uri="{909E8E84-426E-40DD-AFC4-6F175D3DCCD1}">
+              <a14:hiddenFill xmlns:a14="http://schemas.microsoft.com/office/drawing/2010/main">
+                <a:solidFill>
+                  <a:srgbClr val="FFFFFF"/>
+                </a:solidFill>
+              </a14:hiddenFill>
+            </a:ext>
+          </a:extLst>
+        </p:spPr>
+      </p:pic>
+    </p:spTree>
+    <p:extLst>
+      <p:ext uri="{BB962C8B-B14F-4D97-AF65-F5344CB8AC3E}">
+        <p14:creationId xmlns:p14="http://schemas.microsoft.com/office/powerpoint/2010/main" val="2519083767"/>
+      </p:ext>
+    </p:extLst>
+  </p:cSld>
+  <p:clrMapOvr>
+    <a:masterClrMapping/>
+  </p:clrMapOvr>
+  <p:timing>
+    <p:tnLst>
+      <p:par>
+        <p:cTn id="1" dur="indefinite" restart="never" nodeType="tmRoot"/>
+      </p:par>
+    </p:tnLst>
+  </p:timing>
 </p:sld>
 </file>
 

</xml_diff>